<commit_message>
Update ANL201 Study Unit 6_2021 - Lecturer.pptx
</commit_message>
<xml_diff>
--- a/SuSS/ANL201 Study Unit 6_2021 - Lecturer.pptx
+++ b/SuSS/ANL201 Study Unit 6_2021 - Lecturer.pptx
@@ -244,7 +244,7 @@
           <a:p>
             <a:fld id="{FB7F86EF-755F-EF49-95CD-E6F9DEA0E285}" type="datetimeFigureOut">
               <a:rPr lang="en-US" smtClean="0"/>
-              <a:t>1/28/2021</a:t>
+              <a:t>1/29/2021</a:t>
             </a:fld>
             <a:endParaRPr lang="en-US"/>
           </a:p>
@@ -409,7 +409,7 @@
           <a:p>
             <a:fld id="{847550CD-65C1-0D40-9457-6DF5C95A232D}" type="datetimeFigureOut">
               <a:rPr lang="en-US" smtClean="0"/>
-              <a:t>1/28/2021</a:t>
+              <a:t>1/29/2021</a:t>
             </a:fld>
             <a:endParaRPr lang="en-US"/>
           </a:p>
@@ -19836,6 +19836,76 @@
           </a:effectLst>
         </p:spPr>
       </p:pic>
+      <p:sp>
+        <p:nvSpPr>
+          <p:cNvPr id="7" name="Rectangle 6">
+            <a:extLst>
+              <a:ext uri="{FF2B5EF4-FFF2-40B4-BE49-F238E27FC236}">
+                <a16:creationId xmlns:a16="http://schemas.microsoft.com/office/drawing/2014/main" id="{A4884850-FE97-4A84-8A44-BD750F920871}"/>
+              </a:ext>
+            </a:extLst>
+          </p:cNvPr>
+          <p:cNvSpPr/>
+          <p:nvPr/>
+        </p:nvSpPr>
+        <p:spPr>
+          <a:xfrm>
+            <a:off x="7572243" y="3663190"/>
+            <a:ext cx="1207982" cy="923350"/>
+          </a:xfrm>
+          <a:prstGeom prst="rect">
+            <a:avLst/>
+          </a:prstGeom>
+          <a:solidFill>
+            <a:schemeClr val="bg1"/>
+          </a:solidFill>
+        </p:spPr>
+        <p:style>
+          <a:lnRef idx="1">
+            <a:schemeClr val="accent1"/>
+          </a:lnRef>
+          <a:fillRef idx="3">
+            <a:schemeClr val="accent1"/>
+          </a:fillRef>
+          <a:effectRef idx="2">
+            <a:schemeClr val="accent1"/>
+          </a:effectRef>
+          <a:fontRef idx="minor">
+            <a:schemeClr val="lt1"/>
+          </a:fontRef>
+        </p:style>
+        <p:txBody>
+          <a:bodyPr rot="0" spcFirstLastPara="0" vertOverflow="overflow" horzOverflow="overflow" vert="horz" wrap="square" lIns="91440" tIns="45720" rIns="91440" bIns="45720" numCol="1" spcCol="0" rtlCol="0" fromWordArt="0" anchor="ctr" anchorCtr="0" forceAA="0" compatLnSpc="1">
+            <a:prstTxWarp prst="textNoShape">
+              <a:avLst/>
+            </a:prstTxWarp>
+            <a:noAutofit/>
+          </a:bodyPr>
+          <a:lstStyle/>
+          <a:p>
+            <a:pPr algn="ctr"/>
+            <a:r>
+              <a:rPr lang="en-US" sz="1400" dirty="0">
+                <a:solidFill>
+                  <a:srgbClr val="6600FF"/>
+                </a:solidFill>
+              </a:rPr>
+              <a:t>Multi-Dimensional</a:t>
+            </a:r>
+          </a:p>
+          <a:p>
+            <a:pPr algn="ctr"/>
+            <a:r>
+              <a:rPr lang="en-US" sz="1400" dirty="0">
+                <a:solidFill>
+                  <a:srgbClr val="6600FF"/>
+                </a:solidFill>
+              </a:rPr>
+              <a:t>Slice-and-dice</a:t>
+            </a:r>
+          </a:p>
+        </p:txBody>
+      </p:sp>
     </p:spTree>
     <p:extLst>
       <p:ext uri="{BB962C8B-B14F-4D97-AF65-F5344CB8AC3E}">
@@ -20270,6 +20340,65 @@
           </a:effectLst>
         </p:spPr>
       </p:pic>
+      <p:sp>
+        <p:nvSpPr>
+          <p:cNvPr id="6" name="Rectangle 5">
+            <a:extLst>
+              <a:ext uri="{FF2B5EF4-FFF2-40B4-BE49-F238E27FC236}">
+                <a16:creationId xmlns:a16="http://schemas.microsoft.com/office/drawing/2014/main" id="{98EE17AB-2D14-43EB-8786-F98863A7005D}"/>
+              </a:ext>
+            </a:extLst>
+          </p:cNvPr>
+          <p:cNvSpPr/>
+          <p:nvPr/>
+        </p:nvSpPr>
+        <p:spPr>
+          <a:xfrm>
+            <a:off x="7936018" y="3614837"/>
+            <a:ext cx="1207982" cy="923350"/>
+          </a:xfrm>
+          <a:prstGeom prst="rect">
+            <a:avLst/>
+          </a:prstGeom>
+          <a:solidFill>
+            <a:schemeClr val="bg1"/>
+          </a:solidFill>
+        </p:spPr>
+        <p:style>
+          <a:lnRef idx="1">
+            <a:schemeClr val="accent1"/>
+          </a:lnRef>
+          <a:fillRef idx="3">
+            <a:schemeClr val="accent1"/>
+          </a:fillRef>
+          <a:effectRef idx="2">
+            <a:schemeClr val="accent1"/>
+          </a:effectRef>
+          <a:fontRef idx="minor">
+            <a:schemeClr val="lt1"/>
+          </a:fontRef>
+        </p:style>
+        <p:txBody>
+          <a:bodyPr rot="0" spcFirstLastPara="0" vertOverflow="overflow" horzOverflow="overflow" vert="horz" wrap="square" lIns="91440" tIns="45720" rIns="91440" bIns="45720" numCol="1" spcCol="0" rtlCol="0" fromWordArt="0" anchor="ctr" anchorCtr="0" forceAA="0" compatLnSpc="1">
+            <a:prstTxWarp prst="textNoShape">
+              <a:avLst/>
+            </a:prstTxWarp>
+            <a:noAutofit/>
+          </a:bodyPr>
+          <a:lstStyle/>
+          <a:p>
+            <a:pPr algn="ctr"/>
+            <a:r>
+              <a:rPr lang="en-US" sz="1400" dirty="0">
+                <a:solidFill>
+                  <a:srgbClr val="6600FF"/>
+                </a:solidFill>
+              </a:rPr>
+              <a:t>Specific to the task</a:t>
+            </a:r>
+          </a:p>
+        </p:txBody>
+      </p:sp>
     </p:spTree>
     <p:extLst>
       <p:ext uri="{BB962C8B-B14F-4D97-AF65-F5344CB8AC3E}">
@@ -20469,6 +20598,183 @@
           </a:p>
         </p:txBody>
       </p:sp>
+      <p:sp>
+        <p:nvSpPr>
+          <p:cNvPr id="5" name="Rectangle 4">
+            <a:extLst>
+              <a:ext uri="{FF2B5EF4-FFF2-40B4-BE49-F238E27FC236}">
+                <a16:creationId xmlns:a16="http://schemas.microsoft.com/office/drawing/2014/main" id="{C8DE6D5D-A2EE-4C3C-9A9B-E60BF1BCE7AB}"/>
+              </a:ext>
+            </a:extLst>
+          </p:cNvPr>
+          <p:cNvSpPr/>
+          <p:nvPr/>
+        </p:nvSpPr>
+        <p:spPr>
+          <a:xfrm>
+            <a:off x="8126874" y="1690006"/>
+            <a:ext cx="902138" cy="412869"/>
+          </a:xfrm>
+          <a:prstGeom prst="rect">
+            <a:avLst/>
+          </a:prstGeom>
+          <a:solidFill>
+            <a:schemeClr val="bg1"/>
+          </a:solidFill>
+        </p:spPr>
+        <p:style>
+          <a:lnRef idx="1">
+            <a:schemeClr val="accent1"/>
+          </a:lnRef>
+          <a:fillRef idx="3">
+            <a:schemeClr val="accent1"/>
+          </a:fillRef>
+          <a:effectRef idx="2">
+            <a:schemeClr val="accent1"/>
+          </a:effectRef>
+          <a:fontRef idx="minor">
+            <a:schemeClr val="lt1"/>
+          </a:fontRef>
+        </p:style>
+        <p:txBody>
+          <a:bodyPr rot="0" spcFirstLastPara="0" vertOverflow="overflow" horzOverflow="overflow" vert="horz" wrap="square" lIns="91440" tIns="45720" rIns="91440" bIns="45720" numCol="1" spcCol="0" rtlCol="0" fromWordArt="0" anchor="ctr" anchorCtr="0" forceAA="0" compatLnSpc="1">
+            <a:prstTxWarp prst="textNoShape">
+              <a:avLst/>
+            </a:prstTxWarp>
+            <a:noAutofit/>
+          </a:bodyPr>
+          <a:lstStyle/>
+          <a:p>
+            <a:pPr algn="ctr"/>
+            <a:r>
+              <a:rPr lang="en-US" sz="1400" dirty="0">
+                <a:solidFill>
+                  <a:srgbClr val="6600FF"/>
+                </a:solidFill>
+              </a:rPr>
+              <a:t>Mission, Vision</a:t>
+            </a:r>
+          </a:p>
+        </p:txBody>
+      </p:sp>
+      <p:sp>
+        <p:nvSpPr>
+          <p:cNvPr id="6" name="Rectangle 5">
+            <a:extLst>
+              <a:ext uri="{FF2B5EF4-FFF2-40B4-BE49-F238E27FC236}">
+                <a16:creationId xmlns:a16="http://schemas.microsoft.com/office/drawing/2014/main" id="{A315D0A6-D617-4416-98C5-FB38E0BF16C6}"/>
+              </a:ext>
+            </a:extLst>
+          </p:cNvPr>
+          <p:cNvSpPr/>
+          <p:nvPr/>
+        </p:nvSpPr>
+        <p:spPr>
+          <a:xfrm>
+            <a:off x="2154245" y="3272971"/>
+            <a:ext cx="2562897" cy="224972"/>
+          </a:xfrm>
+          <a:prstGeom prst="rect">
+            <a:avLst/>
+          </a:prstGeom>
+          <a:solidFill>
+            <a:schemeClr val="bg1"/>
+          </a:solidFill>
+        </p:spPr>
+        <p:style>
+          <a:lnRef idx="1">
+            <a:schemeClr val="accent1"/>
+          </a:lnRef>
+          <a:fillRef idx="3">
+            <a:schemeClr val="accent1"/>
+          </a:fillRef>
+          <a:effectRef idx="2">
+            <a:schemeClr val="accent1"/>
+          </a:effectRef>
+          <a:fontRef idx="minor">
+            <a:schemeClr val="lt1"/>
+          </a:fontRef>
+        </p:style>
+        <p:txBody>
+          <a:bodyPr rot="0" spcFirstLastPara="0" vertOverflow="overflow" horzOverflow="overflow" vert="horz" wrap="square" lIns="91440" tIns="45720" rIns="91440" bIns="45720" numCol="1" spcCol="0" rtlCol="0" fromWordArt="0" anchor="ctr" anchorCtr="0" forceAA="0" compatLnSpc="1">
+            <a:prstTxWarp prst="textNoShape">
+              <a:avLst/>
+            </a:prstTxWarp>
+            <a:noAutofit/>
+          </a:bodyPr>
+          <a:lstStyle/>
+          <a:p>
+            <a:pPr algn="ctr"/>
+            <a:r>
+              <a:rPr lang="en-US" sz="1400" dirty="0">
+                <a:solidFill>
+                  <a:srgbClr val="6600FF"/>
+                </a:solidFill>
+              </a:rPr>
+              <a:t>Proactive rather than reactive</a:t>
+            </a:r>
+          </a:p>
+        </p:txBody>
+      </p:sp>
+      <p:sp>
+        <p:nvSpPr>
+          <p:cNvPr id="7" name="Rectangle 6">
+            <a:extLst>
+              <a:ext uri="{FF2B5EF4-FFF2-40B4-BE49-F238E27FC236}">
+                <a16:creationId xmlns:a16="http://schemas.microsoft.com/office/drawing/2014/main" id="{5E54C6A1-7E0D-4C74-B54B-68978A316716}"/>
+              </a:ext>
+            </a:extLst>
+          </p:cNvPr>
+          <p:cNvSpPr/>
+          <p:nvPr/>
+        </p:nvSpPr>
+        <p:spPr>
+          <a:xfrm>
+            <a:off x="3678245" y="4268167"/>
+            <a:ext cx="3397469" cy="224972"/>
+          </a:xfrm>
+          <a:prstGeom prst="rect">
+            <a:avLst/>
+          </a:prstGeom>
+          <a:solidFill>
+            <a:schemeClr val="bg1"/>
+          </a:solidFill>
+        </p:spPr>
+        <p:style>
+          <a:lnRef idx="1">
+            <a:schemeClr val="accent1"/>
+          </a:lnRef>
+          <a:fillRef idx="3">
+            <a:schemeClr val="accent1"/>
+          </a:fillRef>
+          <a:effectRef idx="2">
+            <a:schemeClr val="accent1"/>
+          </a:effectRef>
+          <a:fontRef idx="minor">
+            <a:schemeClr val="lt1"/>
+          </a:fontRef>
+        </p:style>
+        <p:txBody>
+          <a:bodyPr rot="0" spcFirstLastPara="0" vertOverflow="overflow" horzOverflow="overflow" vert="horz" wrap="square" lIns="91440" tIns="45720" rIns="91440" bIns="45720" numCol="1" spcCol="0" rtlCol="0" fromWordArt="0" anchor="ctr" anchorCtr="0" forceAA="0" compatLnSpc="1">
+            <a:prstTxWarp prst="textNoShape">
+              <a:avLst/>
+            </a:prstTxWarp>
+            <a:noAutofit/>
+          </a:bodyPr>
+          <a:lstStyle/>
+          <a:p>
+            <a:pPr algn="ctr"/>
+            <a:r>
+              <a:rPr lang="en-US" sz="1400" dirty="0">
+                <a:solidFill>
+                  <a:srgbClr val="6600FF"/>
+                </a:solidFill>
+              </a:rPr>
+              <a:t>(Can be a demotivator too – be careful)</a:t>
+            </a:r>
+          </a:p>
+        </p:txBody>
+      </p:sp>
     </p:spTree>
     <p:extLst>
       <p:ext uri="{BB962C8B-B14F-4D97-AF65-F5344CB8AC3E}">
@@ -20636,6 +20942,132 @@
           </a:p>
         </p:txBody>
       </p:sp>
+      <p:sp>
+        <p:nvSpPr>
+          <p:cNvPr id="5" name="Rectangle 4">
+            <a:extLst>
+              <a:ext uri="{FF2B5EF4-FFF2-40B4-BE49-F238E27FC236}">
+                <a16:creationId xmlns:a16="http://schemas.microsoft.com/office/drawing/2014/main" id="{143A942B-3082-4CAE-BC4A-DB2C426FE666}"/>
+              </a:ext>
+            </a:extLst>
+          </p:cNvPr>
+          <p:cNvSpPr/>
+          <p:nvPr/>
+        </p:nvSpPr>
+        <p:spPr>
+          <a:xfrm>
+            <a:off x="5202246" y="2571750"/>
+            <a:ext cx="1445298" cy="224972"/>
+          </a:xfrm>
+          <a:prstGeom prst="rect">
+            <a:avLst/>
+          </a:prstGeom>
+          <a:solidFill>
+            <a:schemeClr val="bg1"/>
+          </a:solidFill>
+        </p:spPr>
+        <p:style>
+          <a:lnRef idx="1">
+            <a:schemeClr val="accent1"/>
+          </a:lnRef>
+          <a:fillRef idx="3">
+            <a:schemeClr val="accent1"/>
+          </a:fillRef>
+          <a:effectRef idx="2">
+            <a:schemeClr val="accent1"/>
+          </a:effectRef>
+          <a:fontRef idx="minor">
+            <a:schemeClr val="lt1"/>
+          </a:fontRef>
+        </p:style>
+        <p:txBody>
+          <a:bodyPr rot="0" spcFirstLastPara="0" vertOverflow="overflow" horzOverflow="overflow" vert="horz" wrap="square" lIns="91440" tIns="45720" rIns="91440" bIns="45720" numCol="1" spcCol="0" rtlCol="0" fromWordArt="0" anchor="ctr" anchorCtr="0" forceAA="0" compatLnSpc="1">
+            <a:prstTxWarp prst="textNoShape">
+              <a:avLst/>
+            </a:prstTxWarp>
+            <a:noAutofit/>
+          </a:bodyPr>
+          <a:lstStyle/>
+          <a:p>
+            <a:pPr algn="ctr"/>
+            <a:r>
+              <a:rPr lang="en-US" sz="1400" dirty="0">
+                <a:solidFill>
+                  <a:srgbClr val="6600FF"/>
+                </a:solidFill>
+              </a:rPr>
+              <a:t>Collaboration</a:t>
+            </a:r>
+          </a:p>
+        </p:txBody>
+      </p:sp>
+      <p:sp>
+        <p:nvSpPr>
+          <p:cNvPr id="6" name="Rectangle 5">
+            <a:extLst>
+              <a:ext uri="{FF2B5EF4-FFF2-40B4-BE49-F238E27FC236}">
+                <a16:creationId xmlns:a16="http://schemas.microsoft.com/office/drawing/2014/main" id="{F43A457E-11B3-4B08-B8F4-E595F8AD3710}"/>
+              </a:ext>
+            </a:extLst>
+          </p:cNvPr>
+          <p:cNvSpPr/>
+          <p:nvPr/>
+        </p:nvSpPr>
+        <p:spPr>
+          <a:xfrm>
+            <a:off x="3909347" y="3551465"/>
+            <a:ext cx="3855795" cy="224972"/>
+          </a:xfrm>
+          <a:prstGeom prst="rect">
+            <a:avLst/>
+          </a:prstGeom>
+          <a:solidFill>
+            <a:schemeClr val="bg1"/>
+          </a:solidFill>
+        </p:spPr>
+        <p:style>
+          <a:lnRef idx="1">
+            <a:schemeClr val="accent1"/>
+          </a:lnRef>
+          <a:fillRef idx="3">
+            <a:schemeClr val="accent1"/>
+          </a:fillRef>
+          <a:effectRef idx="2">
+            <a:schemeClr val="accent1"/>
+          </a:effectRef>
+          <a:fontRef idx="minor">
+            <a:schemeClr val="lt1"/>
+          </a:fontRef>
+        </p:style>
+        <p:txBody>
+          <a:bodyPr rot="0" spcFirstLastPara="0" vertOverflow="overflow" horzOverflow="overflow" vert="horz" wrap="square" lIns="91440" tIns="45720" rIns="91440" bIns="45720" numCol="1" spcCol="0" rtlCol="0" fromWordArt="0" anchor="ctr" anchorCtr="0" forceAA="0" compatLnSpc="1">
+            <a:prstTxWarp prst="textNoShape">
+              <a:avLst/>
+            </a:prstTxWarp>
+            <a:noAutofit/>
+          </a:bodyPr>
+          <a:lstStyle/>
+          <a:p>
+            <a:pPr algn="ctr"/>
+            <a:r>
+              <a:rPr lang="en-US" sz="1400" dirty="0" err="1">
+                <a:solidFill>
+                  <a:srgbClr val="6600FF"/>
+                </a:solidFill>
+              </a:rPr>
+              <a:t>Standardisation</a:t>
+            </a:r>
+            <a:r>
+              <a:rPr lang="en-US" sz="1400" dirty="0">
+                <a:solidFill>
+                  <a:srgbClr val="6600FF"/>
+                </a:solidFill>
+              </a:rPr>
+              <a:t>; single view on information</a:t>
+            </a:r>
+          </a:p>
+        </p:txBody>
+      </p:sp>
     </p:spTree>
     <p:extLst>
       <p:ext uri="{BB962C8B-B14F-4D97-AF65-F5344CB8AC3E}">
@@ -20803,6 +21235,124 @@
           </a:p>
         </p:txBody>
       </p:sp>
+      <p:sp>
+        <p:nvSpPr>
+          <p:cNvPr id="5" name="Rectangle 4">
+            <a:extLst>
+              <a:ext uri="{FF2B5EF4-FFF2-40B4-BE49-F238E27FC236}">
+                <a16:creationId xmlns:a16="http://schemas.microsoft.com/office/drawing/2014/main" id="{FEDC992B-9FA9-44A0-822F-EEB3D7459724}"/>
+              </a:ext>
+            </a:extLst>
+          </p:cNvPr>
+          <p:cNvSpPr/>
+          <p:nvPr/>
+        </p:nvSpPr>
+        <p:spPr>
+          <a:xfrm>
+            <a:off x="5617029" y="1690006"/>
+            <a:ext cx="3206832" cy="224972"/>
+          </a:xfrm>
+          <a:prstGeom prst="rect">
+            <a:avLst/>
+          </a:prstGeom>
+          <a:solidFill>
+            <a:schemeClr val="bg1"/>
+          </a:solidFill>
+        </p:spPr>
+        <p:style>
+          <a:lnRef idx="1">
+            <a:schemeClr val="accent1"/>
+          </a:lnRef>
+          <a:fillRef idx="3">
+            <a:schemeClr val="accent1"/>
+          </a:fillRef>
+          <a:effectRef idx="2">
+            <a:schemeClr val="accent1"/>
+          </a:effectRef>
+          <a:fontRef idx="minor">
+            <a:schemeClr val="lt1"/>
+          </a:fontRef>
+        </p:style>
+        <p:txBody>
+          <a:bodyPr rot="0" spcFirstLastPara="0" vertOverflow="overflow" horzOverflow="overflow" vert="horz" wrap="square" lIns="91440" tIns="45720" rIns="91440" bIns="45720" numCol="1" spcCol="0" rtlCol="0" fromWordArt="0" anchor="ctr" anchorCtr="0" forceAA="0" compatLnSpc="1">
+            <a:prstTxWarp prst="textNoShape">
+              <a:avLst/>
+            </a:prstTxWarp>
+            <a:noAutofit/>
+          </a:bodyPr>
+          <a:lstStyle/>
+          <a:p>
+            <a:pPr algn="ctr"/>
+            <a:r>
+              <a:rPr lang="en-US" sz="1400" dirty="0">
+                <a:solidFill>
+                  <a:srgbClr val="6600FF"/>
+                </a:solidFill>
+              </a:rPr>
+              <a:t>Simplification of information systems</a:t>
+            </a:r>
+          </a:p>
+        </p:txBody>
+      </p:sp>
+      <p:sp>
+        <p:nvSpPr>
+          <p:cNvPr id="6" name="Rectangle 5">
+            <a:extLst>
+              <a:ext uri="{FF2B5EF4-FFF2-40B4-BE49-F238E27FC236}">
+                <a16:creationId xmlns:a16="http://schemas.microsoft.com/office/drawing/2014/main" id="{9C2F5F94-3802-49E0-B2C3-E3B3C3F3C0F6}"/>
+              </a:ext>
+            </a:extLst>
+          </p:cNvPr>
+          <p:cNvSpPr/>
+          <p:nvPr/>
+        </p:nvSpPr>
+        <p:spPr>
+          <a:xfrm>
+            <a:off x="5529944" y="3228523"/>
+            <a:ext cx="3206832" cy="224972"/>
+          </a:xfrm>
+          <a:prstGeom prst="rect">
+            <a:avLst/>
+          </a:prstGeom>
+          <a:solidFill>
+            <a:schemeClr val="bg1"/>
+          </a:solidFill>
+        </p:spPr>
+        <p:style>
+          <a:lnRef idx="1">
+            <a:schemeClr val="accent1"/>
+          </a:lnRef>
+          <a:fillRef idx="3">
+            <a:schemeClr val="accent1"/>
+          </a:fillRef>
+          <a:effectRef idx="2">
+            <a:schemeClr val="accent1"/>
+          </a:effectRef>
+          <a:fontRef idx="minor">
+            <a:schemeClr val="lt1"/>
+          </a:fontRef>
+        </p:style>
+        <p:txBody>
+          <a:bodyPr rot="0" spcFirstLastPara="0" vertOverflow="overflow" horzOverflow="overflow" vert="horz" wrap="square" lIns="91440" tIns="45720" rIns="91440" bIns="45720" numCol="1" spcCol="0" rtlCol="0" fromWordArt="0" anchor="ctr" anchorCtr="0" forceAA="0" compatLnSpc="1">
+            <a:prstTxWarp prst="textNoShape">
+              <a:avLst/>
+            </a:prstTxWarp>
+            <a:noAutofit/>
+          </a:bodyPr>
+          <a:lstStyle/>
+          <a:p>
+            <a:pPr algn="ctr"/>
+            <a:r>
+              <a:rPr lang="en-US" sz="1400" dirty="0">
+                <a:solidFill>
+                  <a:srgbClr val="6600FF"/>
+                </a:solidFill>
+              </a:rPr>
+              <a:t>Resolve business issues quicker</a:t>
+            </a:r>
+          </a:p>
+        </p:txBody>
+      </p:sp>
     </p:spTree>
     <p:extLst>
       <p:ext uri="{BB962C8B-B14F-4D97-AF65-F5344CB8AC3E}">
@@ -20972,6 +21522,154 @@
           </a:p>
         </p:txBody>
       </p:sp>
+      <p:sp>
+        <p:nvSpPr>
+          <p:cNvPr id="5" name="Rectangle 4">
+            <a:extLst>
+              <a:ext uri="{FF2B5EF4-FFF2-40B4-BE49-F238E27FC236}">
+                <a16:creationId xmlns:a16="http://schemas.microsoft.com/office/drawing/2014/main" id="{E7C4C84A-C7E4-432A-BF8C-A26128F8FF49}"/>
+              </a:ext>
+            </a:extLst>
+          </p:cNvPr>
+          <p:cNvSpPr/>
+          <p:nvPr/>
+        </p:nvSpPr>
+        <p:spPr>
+          <a:xfrm>
+            <a:off x="3178629" y="3389086"/>
+            <a:ext cx="5384800" cy="1619529"/>
+          </a:xfrm>
+          <a:prstGeom prst="rect">
+            <a:avLst/>
+          </a:prstGeom>
+          <a:solidFill>
+            <a:schemeClr val="bg1"/>
+          </a:solidFill>
+        </p:spPr>
+        <p:style>
+          <a:lnRef idx="1">
+            <a:schemeClr val="accent1"/>
+          </a:lnRef>
+          <a:fillRef idx="3">
+            <a:schemeClr val="accent1"/>
+          </a:fillRef>
+          <a:effectRef idx="2">
+            <a:schemeClr val="accent1"/>
+          </a:effectRef>
+          <a:fontRef idx="minor">
+            <a:schemeClr val="lt1"/>
+          </a:fontRef>
+        </p:style>
+        <p:txBody>
+          <a:bodyPr rot="0" spcFirstLastPara="0" vertOverflow="overflow" horzOverflow="overflow" vert="horz" wrap="square" lIns="91440" tIns="45720" rIns="91440" bIns="45720" numCol="1" spcCol="0" rtlCol="0" fromWordArt="0" anchor="ctr" anchorCtr="0" forceAA="0" compatLnSpc="1">
+            <a:prstTxWarp prst="textNoShape">
+              <a:avLst/>
+            </a:prstTxWarp>
+            <a:noAutofit/>
+          </a:bodyPr>
+          <a:lstStyle/>
+          <a:p>
+            <a:pPr algn="ctr"/>
+            <a:r>
+              <a:rPr lang="en-US" sz="1400" dirty="0">
+                <a:solidFill>
+                  <a:srgbClr val="6600FF"/>
+                </a:solidFill>
+              </a:rPr>
+              <a:t>Ask the fundamental questions:</a:t>
+            </a:r>
+          </a:p>
+          <a:p>
+            <a:pPr marL="285750" indent="-285750">
+              <a:buFont typeface="Arial" panose="020B0604020202020204" pitchFamily="34" charset="0"/>
+              <a:buChar char="•"/>
+            </a:pPr>
+            <a:r>
+              <a:rPr lang="en-US" sz="1200" dirty="0">
+                <a:solidFill>
+                  <a:srgbClr val="6600FF"/>
+                </a:solidFill>
+              </a:rPr>
+              <a:t>Who (is my audience)?</a:t>
+            </a:r>
+          </a:p>
+          <a:p>
+            <a:pPr marL="285750" indent="-285750">
+              <a:buFont typeface="Arial" panose="020B0604020202020204" pitchFamily="34" charset="0"/>
+              <a:buChar char="•"/>
+            </a:pPr>
+            <a:r>
+              <a:rPr lang="en-US" sz="1200" dirty="0">
+                <a:solidFill>
+                  <a:srgbClr val="6600FF"/>
+                </a:solidFill>
+              </a:rPr>
+              <a:t>What (is my objective – information sharing or KPI or …)?</a:t>
+            </a:r>
+          </a:p>
+          <a:p>
+            <a:pPr marL="285750" indent="-285750">
+              <a:buFont typeface="Arial" panose="020B0604020202020204" pitchFamily="34" charset="0"/>
+              <a:buChar char="•"/>
+            </a:pPr>
+            <a:r>
+              <a:rPr lang="en-US" sz="1200" dirty="0">
+                <a:solidFill>
+                  <a:srgbClr val="6600FF"/>
+                </a:solidFill>
+              </a:rPr>
+              <a:t>Where (will I need to focus on – visuals, data, data collection)?</a:t>
+            </a:r>
+          </a:p>
+          <a:p>
+            <a:pPr marL="285750" indent="-285750">
+              <a:buFont typeface="Arial" panose="020B0604020202020204" pitchFamily="34" charset="0"/>
+              <a:buChar char="•"/>
+            </a:pPr>
+            <a:r>
+              <a:rPr lang="en-US" sz="1200" dirty="0">
+                <a:solidFill>
+                  <a:srgbClr val="6600FF"/>
+                </a:solidFill>
+              </a:rPr>
+              <a:t>When (was this data collected, when do I intend for it to be actioned, is it still relevant)?</a:t>
+            </a:r>
+          </a:p>
+          <a:p>
+            <a:pPr marL="285750" indent="-285750">
+              <a:buFont typeface="Arial" panose="020B0604020202020204" pitchFamily="34" charset="0"/>
+              <a:buChar char="•"/>
+            </a:pPr>
+            <a:r>
+              <a:rPr lang="en-US" sz="1200" dirty="0">
+                <a:solidFill>
+                  <a:srgbClr val="6600FF"/>
+                </a:solidFill>
+              </a:rPr>
+              <a:t>Why (is a dashboard necessary, can I just use pen and paper)?</a:t>
+            </a:r>
+          </a:p>
+          <a:p>
+            <a:pPr marL="285750" indent="-285750">
+              <a:buFont typeface="Arial" panose="020B0604020202020204" pitchFamily="34" charset="0"/>
+              <a:buChar char="•"/>
+            </a:pPr>
+            <a:r>
+              <a:rPr lang="en-US" sz="1200" dirty="0">
+                <a:solidFill>
+                  <a:srgbClr val="6600FF"/>
+                </a:solidFill>
+              </a:rPr>
+              <a:t>How (will I explain what I created)?</a:t>
+            </a:r>
+            <a:endParaRPr lang="en-US" sz="1400" dirty="0">
+              <a:solidFill>
+                <a:srgbClr val="6600FF"/>
+              </a:solidFill>
+            </a:endParaRPr>
+          </a:p>
+        </p:txBody>
+      </p:sp>
     </p:spTree>
     <p:extLst>
       <p:ext uri="{BB962C8B-B14F-4D97-AF65-F5344CB8AC3E}">
@@ -21313,6 +22011,307 @@
                 <a:ea typeface="Roboto Light" panose="02000000000000000000" pitchFamily="2" charset="0"/>
               </a:rPr>
               <a:t>Use titles and labels effectively</a:t>
+            </a:r>
+          </a:p>
+        </p:txBody>
+      </p:sp>
+      <p:sp>
+        <p:nvSpPr>
+          <p:cNvPr id="5" name="Rectangle 4">
+            <a:extLst>
+              <a:ext uri="{FF2B5EF4-FFF2-40B4-BE49-F238E27FC236}">
+                <a16:creationId xmlns:a16="http://schemas.microsoft.com/office/drawing/2014/main" id="{D482A18C-CC4D-449A-953A-9BB2F4C88B70}"/>
+              </a:ext>
+            </a:extLst>
+          </p:cNvPr>
+          <p:cNvSpPr/>
+          <p:nvPr/>
+        </p:nvSpPr>
+        <p:spPr>
+          <a:xfrm>
+            <a:off x="3439061" y="2902857"/>
+            <a:ext cx="5384800" cy="1619529"/>
+          </a:xfrm>
+          <a:prstGeom prst="rect">
+            <a:avLst/>
+          </a:prstGeom>
+          <a:solidFill>
+            <a:schemeClr val="bg1"/>
+          </a:solidFill>
+        </p:spPr>
+        <p:style>
+          <a:lnRef idx="1">
+            <a:schemeClr val="accent1"/>
+          </a:lnRef>
+          <a:fillRef idx="3">
+            <a:schemeClr val="accent1"/>
+          </a:fillRef>
+          <a:effectRef idx="2">
+            <a:schemeClr val="accent1"/>
+          </a:effectRef>
+          <a:fontRef idx="minor">
+            <a:schemeClr val="lt1"/>
+          </a:fontRef>
+        </p:style>
+        <p:txBody>
+          <a:bodyPr rot="0" spcFirstLastPara="0" vertOverflow="overflow" horzOverflow="overflow" vert="horz" wrap="square" lIns="91440" tIns="45720" rIns="91440" bIns="45720" numCol="1" spcCol="0" rtlCol="0" fromWordArt="0" anchor="ctr" anchorCtr="0" forceAA="0" compatLnSpc="1">
+            <a:prstTxWarp prst="textNoShape">
+              <a:avLst/>
+            </a:prstTxWarp>
+            <a:noAutofit/>
+          </a:bodyPr>
+          <a:lstStyle/>
+          <a:p>
+            <a:pPr algn="ctr"/>
+            <a:r>
+              <a:rPr lang="en-US" sz="1400" dirty="0">
+                <a:solidFill>
+                  <a:srgbClr val="6600FF"/>
+                </a:solidFill>
+              </a:rPr>
+              <a:t>Ask the fundamental questions:</a:t>
+            </a:r>
+          </a:p>
+          <a:p>
+            <a:pPr marL="285750" indent="-285750">
+              <a:buFont typeface="Arial" panose="020B0604020202020204" pitchFamily="34" charset="0"/>
+              <a:buChar char="•"/>
+            </a:pPr>
+            <a:r>
+              <a:rPr lang="en-US" sz="1200" dirty="0">
+                <a:solidFill>
+                  <a:srgbClr val="6600FF"/>
+                </a:solidFill>
+              </a:rPr>
+              <a:t>Who (is my audience)?</a:t>
+            </a:r>
+          </a:p>
+          <a:p>
+            <a:pPr marL="285750" indent="-285750">
+              <a:buFont typeface="Arial" panose="020B0604020202020204" pitchFamily="34" charset="0"/>
+              <a:buChar char="•"/>
+            </a:pPr>
+            <a:r>
+              <a:rPr lang="en-US" sz="1200" dirty="0">
+                <a:solidFill>
+                  <a:srgbClr val="6600FF"/>
+                </a:solidFill>
+              </a:rPr>
+              <a:t>What (is my objective – information sharing or KPI or …)?</a:t>
+            </a:r>
+          </a:p>
+          <a:p>
+            <a:pPr marL="285750" indent="-285750">
+              <a:buFont typeface="Arial" panose="020B0604020202020204" pitchFamily="34" charset="0"/>
+              <a:buChar char="•"/>
+            </a:pPr>
+            <a:r>
+              <a:rPr lang="en-US" sz="1200" dirty="0">
+                <a:solidFill>
+                  <a:srgbClr val="6600FF"/>
+                </a:solidFill>
+              </a:rPr>
+              <a:t>Where (will I need to focus on – visuals, data, data collection)?</a:t>
+            </a:r>
+          </a:p>
+          <a:p>
+            <a:pPr marL="285750" indent="-285750">
+              <a:buFont typeface="Arial" panose="020B0604020202020204" pitchFamily="34" charset="0"/>
+              <a:buChar char="•"/>
+            </a:pPr>
+            <a:r>
+              <a:rPr lang="en-US" sz="1200" dirty="0">
+                <a:solidFill>
+                  <a:srgbClr val="6600FF"/>
+                </a:solidFill>
+              </a:rPr>
+              <a:t>When (was this data collected, when do I intend for it to be actioned, is it still relevant)?</a:t>
+            </a:r>
+          </a:p>
+          <a:p>
+            <a:pPr marL="285750" indent="-285750">
+              <a:buFont typeface="Arial" panose="020B0604020202020204" pitchFamily="34" charset="0"/>
+              <a:buChar char="•"/>
+            </a:pPr>
+            <a:r>
+              <a:rPr lang="en-US" sz="1200" dirty="0">
+                <a:solidFill>
+                  <a:srgbClr val="6600FF"/>
+                </a:solidFill>
+              </a:rPr>
+              <a:t>Why (is a dashboard necessary, can I just use pen and paper)?</a:t>
+            </a:r>
+          </a:p>
+          <a:p>
+            <a:pPr marL="285750" indent="-285750">
+              <a:buFont typeface="Arial" panose="020B0604020202020204" pitchFamily="34" charset="0"/>
+              <a:buChar char="•"/>
+            </a:pPr>
+            <a:r>
+              <a:rPr lang="en-US" sz="1200" dirty="0">
+                <a:solidFill>
+                  <a:srgbClr val="6600FF"/>
+                </a:solidFill>
+              </a:rPr>
+              <a:t>How (will I explain what I created)?</a:t>
+            </a:r>
+            <a:endParaRPr lang="en-US" sz="1400" dirty="0">
+              <a:solidFill>
+                <a:srgbClr val="6600FF"/>
+              </a:solidFill>
+            </a:endParaRPr>
+          </a:p>
+        </p:txBody>
+      </p:sp>
+      <p:pic>
+        <p:nvPicPr>
+          <p:cNvPr id="1026" name="Picture 2" descr="Kiss Logo, kiss, love, logo png | PNGEgg">
+            <a:extLst>
+              <a:ext uri="{FF2B5EF4-FFF2-40B4-BE49-F238E27FC236}">
+                <a16:creationId xmlns:a16="http://schemas.microsoft.com/office/drawing/2014/main" id="{1CC2139E-C4D1-4ACF-B922-7AADF955ED14}"/>
+              </a:ext>
+            </a:extLst>
+          </p:cNvPr>
+          <p:cNvPicPr>
+            <a:picLocks noChangeAspect="1" noChangeArrowheads="1"/>
+          </p:cNvPicPr>
+          <p:nvPr/>
+        </p:nvPicPr>
+        <p:blipFill>
+          <a:blip r:embed="rId2">
+            <a:extLst>
+              <a:ext uri="{28A0092B-C50C-407E-A947-70E740481C1C}">
+                <a14:useLocalDpi xmlns:a14="http://schemas.microsoft.com/office/drawing/2010/main" val="0"/>
+              </a:ext>
+            </a:extLst>
+          </a:blip>
+          <a:srcRect/>
+          <a:stretch>
+            <a:fillRect/>
+          </a:stretch>
+        </p:blipFill>
+        <p:spPr bwMode="auto">
+          <a:xfrm>
+            <a:off x="2433297" y="4120149"/>
+            <a:ext cx="764947" cy="521007"/>
+          </a:xfrm>
+          <a:prstGeom prst="rect">
+            <a:avLst/>
+          </a:prstGeom>
+          <a:noFill/>
+          <a:extLst>
+            <a:ext uri="{909E8E84-426E-40DD-AFC4-6F175D3DCCD1}">
+              <a14:hiddenFill xmlns:a14="http://schemas.microsoft.com/office/drawing/2010/main">
+                <a:solidFill>
+                  <a:srgbClr val="FFFFFF"/>
+                </a:solidFill>
+              </a14:hiddenFill>
+            </a:ext>
+          </a:extLst>
+        </p:spPr>
+      </p:pic>
+      <p:pic>
+        <p:nvPicPr>
+          <p:cNvPr id="1028" name="Picture 4" descr="KISS vector logo - KISS logo vector free download">
+            <a:extLst>
+              <a:ext uri="{FF2B5EF4-FFF2-40B4-BE49-F238E27FC236}">
+                <a16:creationId xmlns:a16="http://schemas.microsoft.com/office/drawing/2014/main" id="{D765F13F-C7B8-4067-AF74-69C68962433E}"/>
+              </a:ext>
+            </a:extLst>
+          </p:cNvPr>
+          <p:cNvPicPr>
+            <a:picLocks noChangeAspect="1" noChangeArrowheads="1"/>
+          </p:cNvPicPr>
+          <p:nvPr/>
+        </p:nvPicPr>
+        <p:blipFill>
+          <a:blip r:embed="rId3">
+            <a:extLst>
+              <a:ext uri="{28A0092B-C50C-407E-A947-70E740481C1C}">
+                <a14:useLocalDpi xmlns:a14="http://schemas.microsoft.com/office/drawing/2010/main" val="0"/>
+              </a:ext>
+            </a:extLst>
+          </a:blip>
+          <a:srcRect/>
+          <a:stretch>
+            <a:fillRect/>
+          </a:stretch>
+        </p:blipFill>
+        <p:spPr bwMode="auto">
+          <a:xfrm>
+            <a:off x="1477198" y="3929589"/>
+            <a:ext cx="975786" cy="975786"/>
+          </a:xfrm>
+          <a:prstGeom prst="rect">
+            <a:avLst/>
+          </a:prstGeom>
+          <a:noFill/>
+          <a:extLst>
+            <a:ext uri="{909E8E84-426E-40DD-AFC4-6F175D3DCCD1}">
+              <a14:hiddenFill xmlns:a14="http://schemas.microsoft.com/office/drawing/2010/main">
+                <a:solidFill>
+                  <a:srgbClr val="FFFFFF"/>
+                </a:solidFill>
+              </a14:hiddenFill>
+            </a:ext>
+          </a:extLst>
+        </p:spPr>
+      </p:pic>
+      <p:sp>
+        <p:nvSpPr>
+          <p:cNvPr id="9" name="Rectangle 8">
+            <a:extLst>
+              <a:ext uri="{FF2B5EF4-FFF2-40B4-BE49-F238E27FC236}">
+                <a16:creationId xmlns:a16="http://schemas.microsoft.com/office/drawing/2014/main" id="{FBC7B8F4-C2CE-483C-9E51-B0D1DBD70317}"/>
+              </a:ext>
+            </a:extLst>
+          </p:cNvPr>
+          <p:cNvSpPr/>
+          <p:nvPr/>
+        </p:nvSpPr>
+        <p:spPr>
+          <a:xfrm>
+            <a:off x="1399803" y="4697011"/>
+            <a:ext cx="1887682" cy="297543"/>
+          </a:xfrm>
+          <a:prstGeom prst="rect">
+            <a:avLst/>
+          </a:prstGeom>
+          <a:solidFill>
+            <a:schemeClr val="bg1"/>
+          </a:solidFill>
+        </p:spPr>
+        <p:style>
+          <a:lnRef idx="1">
+            <a:schemeClr val="accent1"/>
+          </a:lnRef>
+          <a:fillRef idx="3">
+            <a:schemeClr val="accent1"/>
+          </a:fillRef>
+          <a:effectRef idx="2">
+            <a:schemeClr val="accent1"/>
+          </a:effectRef>
+          <a:fontRef idx="minor">
+            <a:schemeClr val="lt1"/>
+          </a:fontRef>
+        </p:style>
+        <p:txBody>
+          <a:bodyPr rot="0" spcFirstLastPara="0" vertOverflow="overflow" horzOverflow="overflow" vert="horz" wrap="square" lIns="91440" tIns="45720" rIns="91440" bIns="45720" numCol="1" spcCol="0" rtlCol="0" fromWordArt="0" anchor="ctr" anchorCtr="0" forceAA="0" compatLnSpc="1">
+            <a:prstTxWarp prst="textNoShape">
+              <a:avLst/>
+            </a:prstTxWarp>
+            <a:noAutofit/>
+          </a:bodyPr>
+          <a:lstStyle/>
+          <a:p>
+            <a:pPr algn="ctr"/>
+            <a:r>
+              <a:rPr lang="en-US" sz="1400" dirty="0">
+                <a:solidFill>
+                  <a:srgbClr val="6600FF"/>
+                </a:solidFill>
+              </a:rPr>
+              <a:t>Keep it Super Simple</a:t>
             </a:r>
           </a:p>
         </p:txBody>
@@ -22757,7 +23756,10 @@
           <a:bodyPr anchor="b"/>
           <a:lstStyle/>
           <a:p>
-            <a:endParaRPr lang="en-US" dirty="0"/>
+            <a:r>
+              <a:rPr lang="en-US" dirty="0"/>
+              <a:t>(15 mins)</a:t>
+            </a:r>
           </a:p>
         </p:txBody>
       </p:sp>
@@ -25108,6 +26110,239 @@
           </a:p>
         </p:txBody>
       </p:sp>
+      <p:sp>
+        <p:nvSpPr>
+          <p:cNvPr id="5" name="Rectangle 4">
+            <a:extLst>
+              <a:ext uri="{FF2B5EF4-FFF2-40B4-BE49-F238E27FC236}">
+                <a16:creationId xmlns:a16="http://schemas.microsoft.com/office/drawing/2014/main" id="{38AB3C08-F11F-409E-8528-78EA5573B5F7}"/>
+              </a:ext>
+            </a:extLst>
+          </p:cNvPr>
+          <p:cNvSpPr/>
+          <p:nvPr/>
+        </p:nvSpPr>
+        <p:spPr>
+          <a:xfrm>
+            <a:off x="892629" y="3404688"/>
+            <a:ext cx="4800600" cy="923350"/>
+          </a:xfrm>
+          <a:prstGeom prst="rect">
+            <a:avLst/>
+          </a:prstGeom>
+          <a:solidFill>
+            <a:schemeClr val="bg1"/>
+          </a:solidFill>
+        </p:spPr>
+        <p:style>
+          <a:lnRef idx="1">
+            <a:schemeClr val="accent1"/>
+          </a:lnRef>
+          <a:fillRef idx="3">
+            <a:schemeClr val="accent1"/>
+          </a:fillRef>
+          <a:effectRef idx="2">
+            <a:schemeClr val="accent1"/>
+          </a:effectRef>
+          <a:fontRef idx="minor">
+            <a:schemeClr val="lt1"/>
+          </a:fontRef>
+        </p:style>
+        <p:txBody>
+          <a:bodyPr rot="0" spcFirstLastPara="0" vertOverflow="overflow" horzOverflow="overflow" vert="horz" wrap="square" lIns="91440" tIns="45720" rIns="91440" bIns="45720" numCol="1" spcCol="0" rtlCol="0" fromWordArt="0" anchor="ctr" anchorCtr="0" forceAA="0" compatLnSpc="1">
+            <a:prstTxWarp prst="textNoShape">
+              <a:avLst/>
+            </a:prstTxWarp>
+            <a:noAutofit/>
+          </a:bodyPr>
+          <a:lstStyle/>
+          <a:p>
+            <a:pPr algn="just"/>
+            <a:r>
+              <a:rPr lang="en-US" sz="1400" dirty="0">
+                <a:solidFill>
+                  <a:srgbClr val="6600FF"/>
+                </a:solidFill>
+              </a:rPr>
+              <a:t>People </a:t>
+            </a:r>
+            <a:r>
+              <a:rPr lang="en-US" sz="1400" dirty="0">
+                <a:solidFill>
+                  <a:srgbClr val="6600FF"/>
+                </a:solidFill>
+                <a:sym typeface="Wingdings" panose="05000000000000000000" pitchFamily="2" charset="2"/>
+              </a:rPr>
+              <a:t> Mange people (movement, resourcing)</a:t>
+            </a:r>
+          </a:p>
+          <a:p>
+            <a:pPr algn="just"/>
+            <a:r>
+              <a:rPr lang="en-US" sz="1400" dirty="0">
+                <a:solidFill>
+                  <a:srgbClr val="6600FF"/>
+                </a:solidFill>
+              </a:rPr>
+              <a:t>Process </a:t>
+            </a:r>
+            <a:r>
+              <a:rPr lang="en-US" sz="1400" dirty="0">
+                <a:solidFill>
+                  <a:srgbClr val="6600FF"/>
+                </a:solidFill>
+                <a:sym typeface="Wingdings" panose="05000000000000000000" pitchFamily="2" charset="2"/>
+              </a:rPr>
+              <a:t> </a:t>
+            </a:r>
+            <a:r>
+              <a:rPr lang="en-US" sz="1400" dirty="0">
+                <a:solidFill>
+                  <a:srgbClr val="6600FF"/>
+                </a:solidFill>
+              </a:rPr>
+              <a:t>Monitor critical business processes &amp; activities</a:t>
+            </a:r>
+            <a:endParaRPr lang="en-US" sz="1400" dirty="0">
+              <a:solidFill>
+                <a:srgbClr val="6600FF"/>
+              </a:solidFill>
+              <a:sym typeface="Wingdings" panose="05000000000000000000" pitchFamily="2" charset="2"/>
+            </a:endParaRPr>
+          </a:p>
+          <a:p>
+            <a:pPr algn="just"/>
+            <a:r>
+              <a:rPr lang="en-US" sz="1400" dirty="0">
+                <a:solidFill>
+                  <a:srgbClr val="6600FF"/>
+                </a:solidFill>
+              </a:rPr>
+              <a:t>Product </a:t>
+            </a:r>
+            <a:r>
+              <a:rPr lang="en-US" sz="1400" dirty="0">
+                <a:solidFill>
+                  <a:srgbClr val="6600FF"/>
+                </a:solidFill>
+                <a:sym typeface="Wingdings" panose="05000000000000000000" pitchFamily="2" charset="2"/>
+              </a:rPr>
+              <a:t> Quantify Logistics, inventory, QA/QC</a:t>
+            </a:r>
+            <a:endParaRPr lang="en-US" sz="1400" dirty="0">
+              <a:solidFill>
+                <a:srgbClr val="6600FF"/>
+              </a:solidFill>
+            </a:endParaRPr>
+          </a:p>
+          <a:p>
+            <a:pPr algn="just"/>
+            <a:r>
+              <a:rPr lang="en-US" sz="1400" dirty="0">
+                <a:solidFill>
+                  <a:srgbClr val="6600FF"/>
+                </a:solidFill>
+              </a:rPr>
+              <a:t>Profit </a:t>
+            </a:r>
+            <a:r>
+              <a:rPr lang="en-US" sz="1400" dirty="0">
+                <a:solidFill>
+                  <a:srgbClr val="6600FF"/>
+                </a:solidFill>
+                <a:sym typeface="Wingdings" panose="05000000000000000000" pitchFamily="2" charset="2"/>
+              </a:rPr>
+              <a:t> Track the meeting of organizational  goals</a:t>
+            </a:r>
+            <a:endParaRPr lang="en-US" sz="1400" dirty="0">
+              <a:solidFill>
+                <a:srgbClr val="6600FF"/>
+              </a:solidFill>
+            </a:endParaRPr>
+          </a:p>
+        </p:txBody>
+      </p:sp>
+      <p:sp>
+        <p:nvSpPr>
+          <p:cNvPr id="6" name="Rectangle 5">
+            <a:extLst>
+              <a:ext uri="{FF2B5EF4-FFF2-40B4-BE49-F238E27FC236}">
+                <a16:creationId xmlns:a16="http://schemas.microsoft.com/office/drawing/2014/main" id="{63DB1801-52FB-4AF0-B55E-94C402F12E40}"/>
+              </a:ext>
+            </a:extLst>
+          </p:cNvPr>
+          <p:cNvSpPr/>
+          <p:nvPr/>
+        </p:nvSpPr>
+        <p:spPr>
+          <a:xfrm>
+            <a:off x="6538685" y="3430996"/>
+            <a:ext cx="2079171" cy="923350"/>
+          </a:xfrm>
+          <a:prstGeom prst="rect">
+            <a:avLst/>
+          </a:prstGeom>
+          <a:solidFill>
+            <a:schemeClr val="bg1"/>
+          </a:solidFill>
+        </p:spPr>
+        <p:style>
+          <a:lnRef idx="1">
+            <a:schemeClr val="accent1"/>
+          </a:lnRef>
+          <a:fillRef idx="3">
+            <a:schemeClr val="accent1"/>
+          </a:fillRef>
+          <a:effectRef idx="2">
+            <a:schemeClr val="accent1"/>
+          </a:effectRef>
+          <a:fontRef idx="minor">
+            <a:schemeClr val="lt1"/>
+          </a:fontRef>
+        </p:style>
+        <p:txBody>
+          <a:bodyPr rot="0" spcFirstLastPara="0" vertOverflow="overflow" horzOverflow="overflow" vert="horz" wrap="square" lIns="91440" tIns="45720" rIns="91440" bIns="45720" numCol="1" spcCol="0" rtlCol="0" fromWordArt="0" anchor="ctr" anchorCtr="0" forceAA="0" compatLnSpc="1">
+            <a:prstTxWarp prst="textNoShape">
+              <a:avLst/>
+            </a:prstTxWarp>
+            <a:noAutofit/>
+          </a:bodyPr>
+          <a:lstStyle/>
+          <a:p>
+            <a:pPr algn="just"/>
+            <a:r>
+              <a:rPr lang="en-US" sz="1400" dirty="0">
+                <a:solidFill>
+                  <a:srgbClr val="6600FF"/>
+                </a:solidFill>
+              </a:rPr>
+              <a:t>Strategic Dashboard</a:t>
+            </a:r>
+          </a:p>
+          <a:p>
+            <a:pPr algn="just"/>
+            <a:r>
+              <a:rPr lang="en-US" sz="1400" dirty="0">
+                <a:solidFill>
+                  <a:srgbClr val="6600FF"/>
+                </a:solidFill>
+              </a:rPr>
+              <a:t>Tactical Dashboard</a:t>
+            </a:r>
+          </a:p>
+          <a:p>
+            <a:pPr algn="just"/>
+            <a:r>
+              <a:rPr lang="en-US" sz="1400" dirty="0">
+                <a:solidFill>
+                  <a:srgbClr val="6600FF"/>
+                </a:solidFill>
+              </a:rPr>
+              <a:t>Operational Dashboard</a:t>
+            </a:r>
+          </a:p>
+        </p:txBody>
+      </p:sp>
     </p:spTree>
     <p:extLst>
       <p:ext uri="{BB962C8B-B14F-4D97-AF65-F5344CB8AC3E}">
@@ -25524,7 +26759,7 @@
         </p:nvSpPr>
         <p:spPr>
           <a:xfrm>
-            <a:off x="3074077" y="4413415"/>
+            <a:off x="1773915" y="4076485"/>
             <a:ext cx="4589160" cy="507831"/>
           </a:xfrm>
           <a:prstGeom prst="rect">
@@ -25586,6 +26821,87 @@
           </a:effectLst>
         </p:spPr>
       </p:pic>
+      <p:sp>
+        <p:nvSpPr>
+          <p:cNvPr id="6" name="Rectangle 5">
+            <a:extLst>
+              <a:ext uri="{FF2B5EF4-FFF2-40B4-BE49-F238E27FC236}">
+                <a16:creationId xmlns:a16="http://schemas.microsoft.com/office/drawing/2014/main" id="{688EEB9D-5E93-43EA-A89A-5E8BF2CC00F9}"/>
+              </a:ext>
+            </a:extLst>
+          </p:cNvPr>
+          <p:cNvSpPr/>
+          <p:nvPr/>
+        </p:nvSpPr>
+        <p:spPr>
+          <a:xfrm>
+            <a:off x="6155567" y="4076485"/>
+            <a:ext cx="1275748" cy="923350"/>
+          </a:xfrm>
+          <a:prstGeom prst="rect">
+            <a:avLst/>
+          </a:prstGeom>
+          <a:solidFill>
+            <a:schemeClr val="bg1"/>
+          </a:solidFill>
+        </p:spPr>
+        <p:style>
+          <a:lnRef idx="1">
+            <a:schemeClr val="accent1"/>
+          </a:lnRef>
+          <a:fillRef idx="3">
+            <a:schemeClr val="accent1"/>
+          </a:fillRef>
+          <a:effectRef idx="2">
+            <a:schemeClr val="accent1"/>
+          </a:effectRef>
+          <a:fontRef idx="minor">
+            <a:schemeClr val="lt1"/>
+          </a:fontRef>
+        </p:style>
+        <p:txBody>
+          <a:bodyPr rot="0" spcFirstLastPara="0" vertOverflow="overflow" horzOverflow="overflow" vert="horz" wrap="square" lIns="91440" tIns="45720" rIns="91440" bIns="45720" numCol="1" spcCol="0" rtlCol="0" fromWordArt="0" anchor="ctr" anchorCtr="0" forceAA="0" compatLnSpc="1">
+            <a:prstTxWarp prst="textNoShape">
+              <a:avLst/>
+            </a:prstTxWarp>
+            <a:noAutofit/>
+          </a:bodyPr>
+          <a:lstStyle/>
+          <a:p>
+            <a:pPr algn="ctr"/>
+            <a:r>
+              <a:rPr lang="en-US" sz="1400" dirty="0">
+                <a:solidFill>
+                  <a:srgbClr val="6600FF"/>
+                </a:solidFill>
+              </a:rPr>
+              <a:t>Simple</a:t>
+            </a:r>
+          </a:p>
+          <a:p>
+            <a:pPr algn="ctr"/>
+            <a:r>
+              <a:rPr lang="en-US" sz="1400" dirty="0">
+                <a:solidFill>
+                  <a:srgbClr val="6600FF"/>
+                </a:solidFill>
+              </a:rPr>
+              <a:t>Visual</a:t>
+            </a:r>
+          </a:p>
+          <a:p>
+            <a:pPr algn="ctr"/>
+            <a:r>
+              <a:rPr lang="en-US" sz="1400" dirty="0">
+                <a:solidFill>
+                  <a:srgbClr val="6600FF"/>
+                </a:solidFill>
+              </a:rPr>
+              <a:t>Intuitive</a:t>
+            </a:r>
+          </a:p>
+        </p:txBody>
+      </p:sp>
     </p:spTree>
     <p:extLst>
       <p:ext uri="{BB962C8B-B14F-4D97-AF65-F5344CB8AC3E}">
@@ -27356,6 +28672,15 @@
 </file>
 
 <file path=customXml/item1.xml><?xml version="1.0" encoding="utf-8"?>
+<p:properties xmlns:p="http://schemas.microsoft.com/office/2006/metadata/properties" xmlns:xsi="http://www.w3.org/2001/XMLSchema-instance" xmlns:pc="http://schemas.microsoft.com/office/infopath/2007/PartnerControls">
+  <documentManagement>
+    <_Version xmlns="http://schemas.microsoft.com/sharepoint/v3/fields" xsi:nil="true"/>
+    <_Status xmlns="http://schemas.microsoft.com/sharepoint/v3/fields">Not Started</_Status>
+  </documentManagement>
+</p:properties>
+</file>
+
+<file path=customXml/item2.xml><?xml version="1.0" encoding="utf-8"?>
 <ct:contentTypeSchema xmlns:ct="http://schemas.microsoft.com/office/2006/metadata/contentType" xmlns:ma="http://schemas.microsoft.com/office/2006/metadata/properties/metaAttributes" ct:_="" ma:_="" ma:contentTypeName="Document" ma:contentTypeID="0x0101000DE64AEEDD9B7A4D93545ACBE97D4615" ma:contentTypeVersion="2" ma:contentTypeDescription="Create a new document." ma:contentTypeScope="" ma:versionID="f49002b78e3a4a71b814eef46a983816">
   <xsd:schema xmlns:xsd="http://www.w3.org/2001/XMLSchema" xmlns:xs="http://www.w3.org/2001/XMLSchema" xmlns:p="http://schemas.microsoft.com/office/2006/metadata/properties" xmlns:ns2="http://schemas.microsoft.com/sharepoint/v3/fields" targetNamespace="http://schemas.microsoft.com/office/2006/metadata/properties" ma:root="true" ma:fieldsID="38f6db2dd0d9a0cf6a8dc37be32b365b" ns2:_="">
     <xsd:import namespace="http://schemas.microsoft.com/sharepoint/v3/fields"/>
@@ -27499,15 +28824,6 @@
 </ct:contentTypeSchema>
 </file>
 
-<file path=customXml/item2.xml><?xml version="1.0" encoding="utf-8"?>
-<p:properties xmlns:p="http://schemas.microsoft.com/office/2006/metadata/properties" xmlns:xsi="http://www.w3.org/2001/XMLSchema-instance" xmlns:pc="http://schemas.microsoft.com/office/infopath/2007/PartnerControls">
-  <documentManagement>
-    <_Version xmlns="http://schemas.microsoft.com/sharepoint/v3/fields" xsi:nil="true"/>
-    <_Status xmlns="http://schemas.microsoft.com/sharepoint/v3/fields">Not Started</_Status>
-  </documentManagement>
-</p:properties>
-</file>
-
 <file path=customXml/item3.xml><?xml version="1.0" encoding="utf-8"?>
 <?mso-contentType ?>
 <FormTemplates xmlns="http://schemas.microsoft.com/sharepoint/v3/contenttype/forms">
@@ -27518,6 +28834,22 @@
 </file>
 
 <file path=customXml/itemProps1.xml><?xml version="1.0" encoding="utf-8"?>
+<ds:datastoreItem xmlns:ds="http://schemas.openxmlformats.org/officeDocument/2006/customXml" ds:itemID="{7B6F2769-7194-4217-93D3-3AF3A4742282}">
+  <ds:schemaRefs>
+    <ds:schemaRef ds:uri="http://purl.org/dc/terms/"/>
+    <ds:schemaRef ds:uri="http://schemas.openxmlformats.org/package/2006/metadata/core-properties"/>
+    <ds:schemaRef ds:uri="http://purl.org/dc/dcmitype/"/>
+    <ds:schemaRef ds:uri="http://schemas.microsoft.com/office/infopath/2007/PartnerControls"/>
+    <ds:schemaRef ds:uri="http://schemas.microsoft.com/office/2006/documentManagement/types"/>
+    <ds:schemaRef ds:uri="http://purl.org/dc/elements/1.1/"/>
+    <ds:schemaRef ds:uri="http://schemas.microsoft.com/office/2006/metadata/properties"/>
+    <ds:schemaRef ds:uri="http://schemas.microsoft.com/sharepoint/v3/fields"/>
+    <ds:schemaRef ds:uri="http://www.w3.org/XML/1998/namespace"/>
+  </ds:schemaRefs>
+</ds:datastoreItem>
+</file>
+
+<file path=customXml/itemProps2.xml><?xml version="1.0" encoding="utf-8"?>
 <ds:datastoreItem xmlns:ds="http://schemas.openxmlformats.org/officeDocument/2006/customXml" ds:itemID="{E4214858-785C-42F7-BE66-6D0E79395FC8}">
   <ds:schemaRefs>
     <ds:schemaRef ds:uri="http://schemas.microsoft.com/office/2006/metadata/contentType"/>
@@ -27535,22 +28867,6 @@
 </ds:datastoreItem>
 </file>
 
-<file path=customXml/itemProps2.xml><?xml version="1.0" encoding="utf-8"?>
-<ds:datastoreItem xmlns:ds="http://schemas.openxmlformats.org/officeDocument/2006/customXml" ds:itemID="{7B6F2769-7194-4217-93D3-3AF3A4742282}">
-  <ds:schemaRefs>
-    <ds:schemaRef ds:uri="http://purl.org/dc/terms/"/>
-    <ds:schemaRef ds:uri="http://schemas.openxmlformats.org/package/2006/metadata/core-properties"/>
-    <ds:schemaRef ds:uri="http://purl.org/dc/dcmitype/"/>
-    <ds:schemaRef ds:uri="http://schemas.microsoft.com/office/infopath/2007/PartnerControls"/>
-    <ds:schemaRef ds:uri="http://schemas.microsoft.com/office/2006/documentManagement/types"/>
-    <ds:schemaRef ds:uri="http://purl.org/dc/elements/1.1/"/>
-    <ds:schemaRef ds:uri="http://schemas.microsoft.com/office/2006/metadata/properties"/>
-    <ds:schemaRef ds:uri="http://schemas.microsoft.com/sharepoint/v3/fields"/>
-    <ds:schemaRef ds:uri="http://www.w3.org/XML/1998/namespace"/>
-  </ds:schemaRefs>
-</ds:datastoreItem>
-</file>
-
 <file path=customXml/itemProps3.xml><?xml version="1.0" encoding="utf-8"?>
 <ds:datastoreItem xmlns:ds="http://schemas.openxmlformats.org/officeDocument/2006/customXml" ds:itemID="{87D2A1B0-FF3E-4009-940D-AED0EB70AA20}">
   <ds:schemaRefs>

</xml_diff>